<commit_message>
Update multiple presentation files to enhance content quality and ensure consistency across topics in the bootcamp materials.
</commit_message>
<xml_diff>
--- a/.slides/topics/08_distributions.pptx
+++ b/.slides/topics/08_distributions.pptx
@@ -17,6 +17,7 @@
     <p:sldId id="265" r:id="rId11"/>
     <p:sldId id="266" r:id="rId12"/>
     <p:sldId id="267" r:id="rId13"/>
+    <p:sldId id="271" r:id="rId14"/>
   </p:sldIdLst>
   <p:sldSz cx="12192000" cy="6858000"/>
   <p:notesSz cx="6858000" cy="9144000"/>
@@ -3482,6 +3483,53 @@
           </a:p>
         </p:txBody>
       </p:sp>
+      <p:pic>
+        <p:nvPicPr>
+          <p:cNvPr id="1026" name="Picture 2">
+            <a:extLst>
+              <a:ext uri="{FF2B5EF4-FFF2-40B4-BE49-F238E27FC236}">
+                <a16:creationId xmlns:a16="http://schemas.microsoft.com/office/drawing/2014/main" id="{5A0C3A32-E5AB-BEE5-5D41-7F2B30B09C5D}"/>
+              </a:ext>
+            </a:extLst>
+          </p:cNvPr>
+          <p:cNvPicPr>
+            <a:picLocks noChangeAspect="1" noChangeArrowheads="1"/>
+          </p:cNvPicPr>
+          <p:nvPr/>
+        </p:nvPicPr>
+        <p:blipFill>
+          <a:blip r:embed="rId3">
+            <a:extLst>
+              <a:ext uri="{28A0092B-C50C-407E-A947-70E740481C1C}">
+                <a14:useLocalDpi xmlns:a14="http://schemas.microsoft.com/office/drawing/2010/main" val="0"/>
+              </a:ext>
+            </a:extLst>
+          </a:blip>
+          <a:srcRect/>
+          <a:stretch>
+            <a:fillRect/>
+          </a:stretch>
+        </p:blipFill>
+        <p:spPr bwMode="auto">
+          <a:xfrm>
+            <a:off x="8644746" y="256905"/>
+            <a:ext cx="3240000" cy="2205692"/>
+          </a:xfrm>
+          <a:prstGeom prst="rect">
+            <a:avLst/>
+          </a:prstGeom>
+          <a:noFill/>
+          <a:extLst>
+            <a:ext uri="{909E8E84-426E-40DD-AFC4-6F175D3DCCD1}">
+              <a14:hiddenFill xmlns:a14="http://schemas.microsoft.com/office/drawing/2010/main">
+                <a:solidFill>
+                  <a:srgbClr val="FFFFFF"/>
+                </a:solidFill>
+              </a14:hiddenFill>
+            </a:ext>
+          </a:extLst>
+        </p:spPr>
+      </p:pic>
     </p:spTree>
   </p:cSld>
   <p:clrMapOvr>
@@ -3553,36 +3601,92 @@
             <p:ph idx="1"/>
           </p:nvPr>
         </p:nvSpPr>
-        <p:spPr/>
-        <p:txBody>
-          <a:bodyPr/>
-          <a:lstStyle/>
-          <a:p>
-            <a:pPr lvl="0"/>
-            <a:r>
+        <p:spPr>
+          <a:xfrm>
+            <a:off x="838200" y="1825625"/>
+            <a:ext cx="5620352" cy="4351338"/>
+          </a:xfrm>
+        </p:spPr>
+        <p:txBody>
+          <a:bodyPr/>
+          <a:lstStyle/>
+          <a:p>
+            <a:pPr lvl="0"/>
+            <a:r>
+              <a:rPr dirty="0"/>
               <a:t>Describes data with exactly two outcomes (0/1, yes/no)</a:t>
             </a:r>
           </a:p>
           <a:p>
             <a:pPr lvl="0"/>
             <a:r>
+              <a:rPr dirty="0"/>
               <a:t>Count of “successes” in series of independent trials</a:t>
             </a:r>
           </a:p>
           <a:p>
             <a:pPr lvl="0"/>
             <a:r>
+              <a:rPr dirty="0"/>
               <a:t>Examples: coin flips, germination success, presence/absence</a:t>
             </a:r>
           </a:p>
           <a:p>
             <a:pPr lvl="0"/>
             <a:r>
+              <a:rPr dirty="0"/>
               <a:t>Two parameters: number of trials (n) and probability (p)</a:t>
             </a:r>
           </a:p>
         </p:txBody>
       </p:sp>
+      <p:pic>
+        <p:nvPicPr>
+          <p:cNvPr id="6146" name="Picture 2">
+            <a:extLst>
+              <a:ext uri="{FF2B5EF4-FFF2-40B4-BE49-F238E27FC236}">
+                <a16:creationId xmlns:a16="http://schemas.microsoft.com/office/drawing/2014/main" id="{E8754E31-B415-FE99-2470-A68E2ED6888B}"/>
+              </a:ext>
+            </a:extLst>
+          </p:cNvPr>
+          <p:cNvPicPr>
+            <a:picLocks noChangeAspect="1" noChangeArrowheads="1"/>
+          </p:cNvPicPr>
+          <p:nvPr/>
+        </p:nvPicPr>
+        <p:blipFill>
+          <a:blip r:embed="rId2">
+            <a:extLst>
+              <a:ext uri="{28A0092B-C50C-407E-A947-70E740481C1C}">
+                <a14:useLocalDpi xmlns:a14="http://schemas.microsoft.com/office/drawing/2010/main" val="0"/>
+              </a:ext>
+            </a:extLst>
+          </a:blip>
+          <a:srcRect/>
+          <a:stretch>
+            <a:fillRect/>
+          </a:stretch>
+        </p:blipFill>
+        <p:spPr bwMode="auto">
+          <a:xfrm>
+            <a:off x="6458552" y="1690688"/>
+            <a:ext cx="5536339" cy="3954528"/>
+          </a:xfrm>
+          <a:prstGeom prst="rect">
+            <a:avLst/>
+          </a:prstGeom>
+          <a:noFill/>
+          <a:extLst>
+            <a:ext uri="{909E8E84-426E-40DD-AFC4-6F175D3DCCD1}">
+              <a14:hiddenFill xmlns:a14="http://schemas.microsoft.com/office/drawing/2010/main">
+                <a:solidFill>
+                  <a:srgbClr val="FFFFFF"/>
+                </a:solidFill>
+              </a14:hiddenFill>
+            </a:ext>
+          </a:extLst>
+        </p:spPr>
+      </p:pic>
     </p:spTree>
   </p:cSld>
   <p:clrMapOvr>
@@ -3793,6 +3897,97 @@
 </p:sld>
 </file>
 
+<file path=ppt/slides/slide13.xml><?xml version="1.0" encoding="utf-8"?>
+<p:sld xmlns:a="http://schemas.openxmlformats.org/drawingml/2006/main" xmlns:r="http://schemas.openxmlformats.org/officeDocument/2006/relationships" xmlns:p="http://schemas.openxmlformats.org/presentationml/2006/main">
+  <p:cSld>
+    <p:spTree>
+      <p:nvGrpSpPr>
+        <p:cNvPr id="1" name=""/>
+        <p:cNvGrpSpPr/>
+        <p:nvPr/>
+      </p:nvGrpSpPr>
+      <p:grpSpPr>
+        <a:xfrm>
+          <a:off x="0" y="0"/>
+          <a:ext cx="0" cy="0"/>
+          <a:chOff x="0" y="0"/>
+          <a:chExt cx="0" cy="0"/>
+        </a:xfrm>
+      </p:grpSpPr>
+      <p:sp>
+        <p:nvSpPr>
+          <p:cNvPr id="2" name="Title 1">
+            <a:extLst>
+              <a:ext uri="{FF2B5EF4-FFF2-40B4-BE49-F238E27FC236}">
+                <a16:creationId xmlns:a16="http://schemas.microsoft.com/office/drawing/2014/main" id="{8525C2D7-E417-70EE-D336-6C2729628304}"/>
+              </a:ext>
+            </a:extLst>
+          </p:cNvPr>
+          <p:cNvSpPr>
+            <a:spLocks noGrp="1"/>
+          </p:cNvSpPr>
+          <p:nvPr>
+            <p:ph type="title"/>
+          </p:nvPr>
+        </p:nvSpPr>
+        <p:spPr/>
+        <p:txBody>
+          <a:bodyPr/>
+          <a:lstStyle/>
+          <a:p>
+            <a:pPr marL="0" lvl="0" indent="0">
+              <a:buNone/>
+            </a:pPr>
+            <a:r>
+              <a:t>Practice Exercises</a:t>
+            </a:r>
+          </a:p>
+        </p:txBody>
+      </p:sp>
+      <p:pic>
+        <p:nvPicPr>
+          <p:cNvPr id="6" name="Picture 5" descr="A cat sitting on a computer&#10;&#10;AI-generated content may be incorrect.">
+            <a:extLst>
+              <a:ext uri="{FF2B5EF4-FFF2-40B4-BE49-F238E27FC236}">
+                <a16:creationId xmlns:a16="http://schemas.microsoft.com/office/drawing/2014/main" id="{D2E0F507-A649-BEC3-934D-D62F9A7982A2}"/>
+              </a:ext>
+            </a:extLst>
+          </p:cNvPr>
+          <p:cNvPicPr>
+            <a:picLocks noChangeAspect="1"/>
+          </p:cNvPicPr>
+          <p:nvPr/>
+        </p:nvPicPr>
+        <p:blipFill>
+          <a:blip r:embed="rId2">
+            <a:extLst>
+              <a:ext uri="{28A0092B-C50C-407E-A947-70E740481C1C}">
+                <a14:useLocalDpi xmlns:a14="http://schemas.microsoft.com/office/drawing/2010/main" val="0"/>
+              </a:ext>
+            </a:extLst>
+          </a:blip>
+          <a:stretch>
+            <a:fillRect/>
+          </a:stretch>
+        </p:blipFill>
+        <p:spPr>
+          <a:xfrm>
+            <a:off x="2154453" y="1417320"/>
+            <a:ext cx="7883093" cy="5255395"/>
+          </a:xfrm>
+          <a:prstGeom prst="rect">
+            <a:avLst/>
+          </a:prstGeom>
+        </p:spPr>
+      </p:pic>
+    </p:spTree>
+  </p:cSld>
+  <p:clrMapOvr>
+    <a:masterClrMapping/>
+  </p:clrMapOvr>
+</p:sld>
+</file>
+
 <file path=ppt/slides/slide2.xml><?xml version="1.0" encoding="utf-8"?>
 <p:sld xmlns:a="http://schemas.openxmlformats.org/drawingml/2006/main" xmlns:r="http://schemas.openxmlformats.org/officeDocument/2006/relationships" xmlns:p="http://schemas.openxmlformats.org/presentationml/2006/main">
   <p:cSld>
@@ -4088,6 +4283,83 @@
           </a:p>
         </p:txBody>
       </p:sp>
+      <p:pic>
+        <p:nvPicPr>
+          <p:cNvPr id="5" name="Picture 4">
+            <a:extLst>
+              <a:ext uri="{FF2B5EF4-FFF2-40B4-BE49-F238E27FC236}">
+                <a16:creationId xmlns:a16="http://schemas.microsoft.com/office/drawing/2014/main" id="{A65D30B5-267E-D649-0E1B-DF0D71DDCC76}"/>
+              </a:ext>
+            </a:extLst>
+          </p:cNvPr>
+          <p:cNvPicPr>
+            <a:picLocks noChangeAspect="1"/>
+          </p:cNvPicPr>
+          <p:nvPr/>
+        </p:nvPicPr>
+        <p:blipFill>
+          <a:blip r:embed="rId2"/>
+          <a:stretch>
+            <a:fillRect/>
+          </a:stretch>
+        </p:blipFill>
+        <p:spPr>
+          <a:xfrm>
+            <a:off x="3592720" y="4772439"/>
+            <a:ext cx="2591162" cy="504895"/>
+          </a:xfrm>
+          <a:prstGeom prst="rect">
+            <a:avLst/>
+          </a:prstGeom>
+        </p:spPr>
+      </p:pic>
+      <p:pic>
+        <p:nvPicPr>
+          <p:cNvPr id="2050" name="Picture 2">
+            <a:extLst>
+              <a:ext uri="{FF2B5EF4-FFF2-40B4-BE49-F238E27FC236}">
+                <a16:creationId xmlns:a16="http://schemas.microsoft.com/office/drawing/2014/main" id="{35102F76-264C-A67B-BF71-F61F1815AFA1}"/>
+              </a:ext>
+            </a:extLst>
+          </p:cNvPr>
+          <p:cNvPicPr>
+            <a:picLocks noChangeAspect="1" noChangeArrowheads="1"/>
+          </p:cNvPicPr>
+          <p:nvPr/>
+        </p:nvPicPr>
+        <p:blipFill>
+          <a:blip r:embed="rId3">
+            <a:extLst>
+              <a:ext uri="{28A0092B-C50C-407E-A947-70E740481C1C}">
+                <a14:useLocalDpi xmlns:a14="http://schemas.microsoft.com/office/drawing/2010/main" val="0"/>
+              </a:ext>
+            </a:extLst>
+          </a:blip>
+          <a:srcRect/>
+          <a:stretch>
+            <a:fillRect/>
+          </a:stretch>
+        </p:blipFill>
+        <p:spPr bwMode="auto">
+          <a:xfrm>
+            <a:off x="7015909" y="3466208"/>
+            <a:ext cx="4337891" cy="3098494"/>
+          </a:xfrm>
+          <a:prstGeom prst="rect">
+            <a:avLst/>
+          </a:prstGeom>
+          <a:noFill/>
+          <a:extLst>
+            <a:ext uri="{909E8E84-426E-40DD-AFC4-6F175D3DCCD1}">
+              <a14:hiddenFill xmlns:a14="http://schemas.microsoft.com/office/drawing/2010/main">
+                <a:solidFill>
+                  <a:srgbClr val="FFFFFF"/>
+                </a:solidFill>
+              </a14:hiddenFill>
+            </a:ext>
+          </a:extLst>
+        </p:spPr>
+      </p:pic>
     </p:spTree>
   </p:cSld>
   <p:clrMapOvr>
@@ -4159,36 +4431,92 @@
             <p:ph idx="1"/>
           </p:nvPr>
         </p:nvSpPr>
-        <p:spPr/>
-        <p:txBody>
-          <a:bodyPr/>
-          <a:lstStyle/>
-          <a:p>
-            <a:pPr lvl="0"/>
-            <a:r>
+        <p:spPr>
+          <a:xfrm>
+            <a:off x="838200" y="1825625"/>
+            <a:ext cx="5591476" cy="4351338"/>
+          </a:xfrm>
+        </p:spPr>
+        <p:txBody>
+          <a:bodyPr/>
+          <a:lstStyle/>
+          <a:p>
+            <a:pPr lvl="0"/>
+            <a:r>
+              <a:rPr dirty="0"/>
               <a:t>Compare sample means to true population mean</a:t>
             </a:r>
           </a:p>
           <a:p>
             <a:pPr lvl="0"/>
             <a:r>
+              <a:rPr dirty="0"/>
               <a:t>Sample means vary randomly around true mean</a:t>
             </a:r>
           </a:p>
           <a:p>
             <a:pPr lvl="0"/>
             <a:r>
+              <a:rPr dirty="0"/>
               <a:t>Most samples close to true mean, fewer farther away</a:t>
             </a:r>
           </a:p>
           <a:p>
             <a:pPr lvl="0"/>
             <a:r>
+              <a:rPr dirty="0"/>
               <a:t>Demonstrates sampling distribution concept</a:t>
             </a:r>
           </a:p>
         </p:txBody>
       </p:sp>
+      <p:pic>
+        <p:nvPicPr>
+          <p:cNvPr id="3074" name="Picture 2">
+            <a:extLst>
+              <a:ext uri="{FF2B5EF4-FFF2-40B4-BE49-F238E27FC236}">
+                <a16:creationId xmlns:a16="http://schemas.microsoft.com/office/drawing/2014/main" id="{CDD539BA-008F-D0E5-8AED-2D936D33F732}"/>
+              </a:ext>
+            </a:extLst>
+          </p:cNvPr>
+          <p:cNvPicPr>
+            <a:picLocks noChangeAspect="1" noChangeArrowheads="1"/>
+          </p:cNvPicPr>
+          <p:nvPr/>
+        </p:nvPicPr>
+        <p:blipFill>
+          <a:blip r:embed="rId2">
+            <a:extLst>
+              <a:ext uri="{28A0092B-C50C-407E-A947-70E740481C1C}">
+                <a14:useLocalDpi xmlns:a14="http://schemas.microsoft.com/office/drawing/2010/main" val="0"/>
+              </a:ext>
+            </a:extLst>
+          </a:blip>
+          <a:srcRect/>
+          <a:stretch>
+            <a:fillRect/>
+          </a:stretch>
+        </p:blipFill>
+        <p:spPr bwMode="auto">
+          <a:xfrm>
+            <a:off x="6189044" y="1690688"/>
+            <a:ext cx="5573829" cy="3981307"/>
+          </a:xfrm>
+          <a:prstGeom prst="rect">
+            <a:avLst/>
+          </a:prstGeom>
+          <a:noFill/>
+          <a:extLst>
+            <a:ext uri="{909E8E84-426E-40DD-AFC4-6F175D3DCCD1}">
+              <a14:hiddenFill xmlns:a14="http://schemas.microsoft.com/office/drawing/2010/main">
+                <a:solidFill>
+                  <a:srgbClr val="FFFFFF"/>
+                </a:solidFill>
+              </a14:hiddenFill>
+            </a:ext>
+          </a:extLst>
+        </p:spPr>
+      </p:pic>
     </p:spTree>
   </p:cSld>
   <p:clrMapOvr>
@@ -4260,36 +4588,92 @@
             <p:ph idx="1"/>
           </p:nvPr>
         </p:nvSpPr>
-        <p:spPr/>
-        <p:txBody>
-          <a:bodyPr/>
-          <a:lstStyle/>
-          <a:p>
-            <a:pPr lvl="0"/>
-            <a:r>
+        <p:spPr>
+          <a:xfrm>
+            <a:off x="838200" y="1825625"/>
+            <a:ext cx="5837722" cy="4351338"/>
+          </a:xfrm>
+        </p:spPr>
+        <p:txBody>
+          <a:bodyPr/>
+          <a:lstStyle/>
+          <a:p>
+            <a:pPr lvl="0"/>
+            <a:r>
+              <a:rPr dirty="0"/>
               <a:t>Classic “bell curve” shaped distribution</a:t>
             </a:r>
           </a:p>
           <a:p>
             <a:pPr lvl="0"/>
             <a:r>
+              <a:rPr dirty="0"/>
               <a:t>Most important for continuous numeric variables</a:t>
             </a:r>
           </a:p>
           <a:p>
             <a:pPr lvl="0"/>
             <a:r>
+              <a:rPr dirty="0"/>
               <a:t>Expected for measurements like height, weight, length</a:t>
             </a:r>
           </a:p>
           <a:p>
             <a:pPr lvl="0"/>
             <a:r>
+              <a:rPr dirty="0"/>
               <a:t>Described by mean and variance parameters</a:t>
             </a:r>
           </a:p>
         </p:txBody>
       </p:sp>
+      <p:pic>
+        <p:nvPicPr>
+          <p:cNvPr id="4098" name="Picture 2">
+            <a:extLst>
+              <a:ext uri="{FF2B5EF4-FFF2-40B4-BE49-F238E27FC236}">
+                <a16:creationId xmlns:a16="http://schemas.microsoft.com/office/drawing/2014/main" id="{D6A4AEE5-F39F-4DB4-054C-A223B843B845}"/>
+              </a:ext>
+            </a:extLst>
+          </p:cNvPr>
+          <p:cNvPicPr>
+            <a:picLocks noChangeAspect="1" noChangeArrowheads="1"/>
+          </p:cNvPicPr>
+          <p:nvPr/>
+        </p:nvPicPr>
+        <p:blipFill>
+          <a:blip r:embed="rId2">
+            <a:extLst>
+              <a:ext uri="{28A0092B-C50C-407E-A947-70E740481C1C}">
+                <a14:useLocalDpi xmlns:a14="http://schemas.microsoft.com/office/drawing/2010/main" val="0"/>
+              </a:ext>
+            </a:extLst>
+          </a:blip>
+          <a:srcRect/>
+          <a:stretch>
+            <a:fillRect/>
+          </a:stretch>
+        </p:blipFill>
+        <p:spPr bwMode="auto">
+          <a:xfrm>
+            <a:off x="6531543" y="1690688"/>
+            <a:ext cx="5319872" cy="3799909"/>
+          </a:xfrm>
+          <a:prstGeom prst="rect">
+            <a:avLst/>
+          </a:prstGeom>
+          <a:noFill/>
+          <a:extLst>
+            <a:ext uri="{909E8E84-426E-40DD-AFC4-6F175D3DCCD1}">
+              <a14:hiddenFill xmlns:a14="http://schemas.microsoft.com/office/drawing/2010/main">
+                <a:solidFill>
+                  <a:srgbClr val="FFFFFF"/>
+                </a:solidFill>
+              </a14:hiddenFill>
+            </a:ext>
+          </a:extLst>
+        </p:spPr>
+      </p:pic>
     </p:spTree>
   </p:cSld>
   <p:clrMapOvr>
@@ -4492,6 +4876,36 @@
           </a:p>
         </p:txBody>
       </p:sp>
+      <p:pic>
+        <p:nvPicPr>
+          <p:cNvPr id="5" name="Picture 4">
+            <a:extLst>
+              <a:ext uri="{FF2B5EF4-FFF2-40B4-BE49-F238E27FC236}">
+                <a16:creationId xmlns:a16="http://schemas.microsoft.com/office/drawing/2014/main" id="{44BE6E0C-82F1-DC6A-A68D-D92861035125}"/>
+              </a:ext>
+            </a:extLst>
+          </p:cNvPr>
+          <p:cNvPicPr>
+            <a:picLocks noChangeAspect="1"/>
+          </p:cNvPicPr>
+          <p:nvPr/>
+        </p:nvPicPr>
+        <p:blipFill>
+          <a:blip r:embed="rId2"/>
+          <a:stretch>
+            <a:fillRect/>
+          </a:stretch>
+        </p:blipFill>
+        <p:spPr>
+          <a:xfrm>
+            <a:off x="3726347" y="3882489"/>
+            <a:ext cx="3887236" cy="2793950"/>
+          </a:xfrm>
+          <a:prstGeom prst="rect">
+            <a:avLst/>
+          </a:prstGeom>
+        </p:spPr>
+      </p:pic>
     </p:spTree>
   </p:cSld>
   <p:clrMapOvr>
@@ -4563,36 +4977,92 @@
             <p:ph idx="1"/>
           </p:nvPr>
         </p:nvSpPr>
-        <p:spPr/>
-        <p:txBody>
-          <a:bodyPr/>
-          <a:lstStyle/>
-          <a:p>
-            <a:pPr lvl="0"/>
-            <a:r>
+        <p:spPr>
+          <a:xfrm>
+            <a:off x="838200" y="1825625"/>
+            <a:ext cx="5491213" cy="4351338"/>
+          </a:xfrm>
+        </p:spPr>
+        <p:txBody>
+          <a:bodyPr/>
+          <a:lstStyle/>
+          <a:p>
+            <a:pPr lvl="0"/>
+            <a:r>
+              <a:rPr dirty="0"/>
               <a:t>Used for count data of discrete events</a:t>
             </a:r>
           </a:p>
           <a:p>
             <a:pPr lvl="0"/>
             <a:r>
+              <a:rPr dirty="0"/>
               <a:t>Classic example: events occurring over time/space</a:t>
             </a:r>
           </a:p>
           <a:p>
             <a:pPr lvl="0"/>
             <a:r>
+              <a:rPr dirty="0"/>
               <a:t>Data typically skewed to the right</a:t>
             </a:r>
           </a:p>
           <a:p>
             <a:pPr lvl="0"/>
             <a:r>
+              <a:rPr dirty="0"/>
               <a:t>Single parameter λ (lambda) describes mean and variance</a:t>
             </a:r>
           </a:p>
         </p:txBody>
       </p:sp>
+      <p:pic>
+        <p:nvPicPr>
+          <p:cNvPr id="5122" name="Picture 2">
+            <a:extLst>
+              <a:ext uri="{FF2B5EF4-FFF2-40B4-BE49-F238E27FC236}">
+                <a16:creationId xmlns:a16="http://schemas.microsoft.com/office/drawing/2014/main" id="{5B4B31DD-1279-1C50-93A3-2CD2DB01944E}"/>
+              </a:ext>
+            </a:extLst>
+          </p:cNvPr>
+          <p:cNvPicPr>
+            <a:picLocks noChangeAspect="1" noChangeArrowheads="1"/>
+          </p:cNvPicPr>
+          <p:nvPr/>
+        </p:nvPicPr>
+        <p:blipFill>
+          <a:blip r:embed="rId2">
+            <a:extLst>
+              <a:ext uri="{28A0092B-C50C-407E-A947-70E740481C1C}">
+                <a14:useLocalDpi xmlns:a14="http://schemas.microsoft.com/office/drawing/2010/main" val="0"/>
+              </a:ext>
+            </a:extLst>
+          </a:blip>
+          <a:srcRect/>
+          <a:stretch>
+            <a:fillRect/>
+          </a:stretch>
+        </p:blipFill>
+        <p:spPr bwMode="auto">
+          <a:xfrm>
+            <a:off x="6541169" y="1690688"/>
+            <a:ext cx="5491213" cy="3922295"/>
+          </a:xfrm>
+          <a:prstGeom prst="rect">
+            <a:avLst/>
+          </a:prstGeom>
+          <a:noFill/>
+          <a:extLst>
+            <a:ext uri="{909E8E84-426E-40DD-AFC4-6F175D3DCCD1}">
+              <a14:hiddenFill xmlns:a14="http://schemas.microsoft.com/office/drawing/2010/main">
+                <a:solidFill>
+                  <a:srgbClr val="FFFFFF"/>
+                </a:solidFill>
+              </a14:hiddenFill>
+            </a:ext>
+          </a:extLst>
+        </p:spPr>
+      </p:pic>
     </p:spTree>
   </p:cSld>
   <p:clrMapOvr>

</xml_diff>